<commit_message>
Update Bicycle Management class diagram
</commit_message>
<xml_diff>
--- a/docs/diagrams/BicycleManagementClassDiagram.pptx
+++ b/docs/diagrams/BicycleManagementClassDiagram.pptx
@@ -208,7 +208,7 @@
           <a:p>
             <a:fld id="{F5CC4B3F-88C1-4FFA-B1B6-F41C21DC6924}" type="datetimeFigureOut">
               <a:rPr lang="en-US" smtClean="0"/>
-              <a:t>10/22/2018</a:t>
+              <a:t>11/1/2018</a:t>
             </a:fld>
             <a:endParaRPr lang="en-US"/>
           </a:p>
@@ -654,7 +654,7 @@
           <a:p>
             <a:fld id="{78C97017-6FC3-485B-9764-EAC9E56C1D49}" type="datetimeFigureOut">
               <a:rPr lang="en-US" smtClean="0"/>
-              <a:t>10/22/2018</a:t>
+              <a:t>11/1/2018</a:t>
             </a:fld>
             <a:endParaRPr lang="en-US"/>
           </a:p>
@@ -822,7 +822,7 @@
           <a:p>
             <a:fld id="{78C97017-6FC3-485B-9764-EAC9E56C1D49}" type="datetimeFigureOut">
               <a:rPr lang="en-US" smtClean="0"/>
-              <a:t>10/22/2018</a:t>
+              <a:t>11/1/2018</a:t>
             </a:fld>
             <a:endParaRPr lang="en-US"/>
           </a:p>
@@ -1000,7 +1000,7 @@
           <a:p>
             <a:fld id="{78C97017-6FC3-485B-9764-EAC9E56C1D49}" type="datetimeFigureOut">
               <a:rPr lang="en-US" smtClean="0"/>
-              <a:t>10/22/2018</a:t>
+              <a:t>11/1/2018</a:t>
             </a:fld>
             <a:endParaRPr lang="en-US"/>
           </a:p>
@@ -1168,7 +1168,7 @@
           <a:p>
             <a:fld id="{78C97017-6FC3-485B-9764-EAC9E56C1D49}" type="datetimeFigureOut">
               <a:rPr lang="en-US" smtClean="0"/>
-              <a:t>10/22/2018</a:t>
+              <a:t>11/1/2018</a:t>
             </a:fld>
             <a:endParaRPr lang="en-US"/>
           </a:p>
@@ -1413,7 +1413,7 @@
           <a:p>
             <a:fld id="{78C97017-6FC3-485B-9764-EAC9E56C1D49}" type="datetimeFigureOut">
               <a:rPr lang="en-US" smtClean="0"/>
-              <a:t>10/22/2018</a:t>
+              <a:t>11/1/2018</a:t>
             </a:fld>
             <a:endParaRPr lang="en-US"/>
           </a:p>
@@ -1698,7 +1698,7 @@
           <a:p>
             <a:fld id="{78C97017-6FC3-485B-9764-EAC9E56C1D49}" type="datetimeFigureOut">
               <a:rPr lang="en-US" smtClean="0"/>
-              <a:t>10/22/2018</a:t>
+              <a:t>11/1/2018</a:t>
             </a:fld>
             <a:endParaRPr lang="en-US"/>
           </a:p>
@@ -2117,7 +2117,7 @@
           <a:p>
             <a:fld id="{78C97017-6FC3-485B-9764-EAC9E56C1D49}" type="datetimeFigureOut">
               <a:rPr lang="en-US" smtClean="0"/>
-              <a:t>10/22/2018</a:t>
+              <a:t>11/1/2018</a:t>
             </a:fld>
             <a:endParaRPr lang="en-US"/>
           </a:p>
@@ -2234,7 +2234,7 @@
           <a:p>
             <a:fld id="{78C97017-6FC3-485B-9764-EAC9E56C1D49}" type="datetimeFigureOut">
               <a:rPr lang="en-US" smtClean="0"/>
-              <a:t>10/22/2018</a:t>
+              <a:t>11/1/2018</a:t>
             </a:fld>
             <a:endParaRPr lang="en-US"/>
           </a:p>
@@ -2329,7 +2329,7 @@
           <a:p>
             <a:fld id="{78C97017-6FC3-485B-9764-EAC9E56C1D49}" type="datetimeFigureOut">
               <a:rPr lang="en-US" smtClean="0"/>
-              <a:t>10/22/2018</a:t>
+              <a:t>11/1/2018</a:t>
             </a:fld>
             <a:endParaRPr lang="en-US"/>
           </a:p>
@@ -2604,7 +2604,7 @@
           <a:p>
             <a:fld id="{78C97017-6FC3-485B-9764-EAC9E56C1D49}" type="datetimeFigureOut">
               <a:rPr lang="en-US" smtClean="0"/>
-              <a:t>10/22/2018</a:t>
+              <a:t>11/1/2018</a:t>
             </a:fld>
             <a:endParaRPr lang="en-US"/>
           </a:p>
@@ -2856,7 +2856,7 @@
           <a:p>
             <a:fld id="{78C97017-6FC3-485B-9764-EAC9E56C1D49}" type="datetimeFigureOut">
               <a:rPr lang="en-US" smtClean="0"/>
-              <a:t>10/22/2018</a:t>
+              <a:t>11/1/2018</a:t>
             </a:fld>
             <a:endParaRPr lang="en-US"/>
           </a:p>
@@ -3067,7 +3067,7 @@
           <a:p>
             <a:fld id="{78C97017-6FC3-485B-9764-EAC9E56C1D49}" type="datetimeFigureOut">
               <a:rPr lang="en-US" smtClean="0"/>
-              <a:t>10/22/2018</a:t>
+              <a:t>11/1/2018</a:t>
             </a:fld>
             <a:endParaRPr lang="en-US"/>
           </a:p>
@@ -3450,8 +3450,8 @@
         </p:nvSpPr>
         <p:spPr>
           <a:xfrm>
-            <a:off x="1421300" y="493870"/>
-            <a:ext cx="6122500" cy="4419600"/>
+            <a:off x="1676400" y="454022"/>
+            <a:ext cx="4800600" cy="4419600"/>
           </a:xfrm>
           <a:prstGeom prst="roundRect">
             <a:avLst>
@@ -3511,7 +3511,7 @@
         </p:nvSpPr>
         <p:spPr>
           <a:xfrm>
-            <a:off x="4022197" y="543170"/>
+            <a:off x="3681306" y="565961"/>
             <a:ext cx="892703" cy="334856"/>
           </a:xfrm>
           <a:prstGeom prst="rect">
@@ -3623,7 +3623,7 @@
         </p:nvSpPr>
         <p:spPr>
           <a:xfrm rot="5400000">
-            <a:off x="4332992" y="934297"/>
+            <a:off x="3992101" y="957088"/>
             <a:ext cx="236048" cy="173380"/>
           </a:xfrm>
           <a:prstGeom prst="flowChartDecision">
@@ -3854,7 +3854,7 @@
         </p:nvSpPr>
         <p:spPr>
           <a:xfrm>
-            <a:off x="6523279" y="1681909"/>
+            <a:off x="5735881" y="1681909"/>
             <a:ext cx="189257" cy="178683"/>
           </a:xfrm>
           <a:prstGeom prst="rect">
@@ -3897,8 +3897,8 @@
         </p:nvCxnSpPr>
         <p:spPr>
           <a:xfrm rot="5400000">
-            <a:off x="3669209" y="478888"/>
-            <a:ext cx="121685" cy="1441931"/>
+            <a:off x="3510158" y="660729"/>
+            <a:ext cx="98894" cy="1101040"/>
           </a:xfrm>
           <a:prstGeom prst="bentConnector2">
             <a:avLst/>
@@ -3941,7 +3941,7 @@
         </p:nvSpPr>
         <p:spPr>
           <a:xfrm>
-            <a:off x="5928012" y="1134334"/>
+            <a:off x="5140614" y="1134334"/>
             <a:ext cx="1156969" cy="252723"/>
           </a:xfrm>
           <a:prstGeom prst="rect">
@@ -4003,7 +4003,7 @@
         </p:nvSpPr>
         <p:spPr>
           <a:xfrm>
-            <a:off x="5837090" y="1875828"/>
+            <a:off x="5049692" y="1875828"/>
             <a:ext cx="1288132" cy="252723"/>
           </a:xfrm>
           <a:prstGeom prst="rect">
@@ -4065,7 +4065,7 @@
         </p:nvSpPr>
         <p:spPr>
           <a:xfrm rot="5400000">
-            <a:off x="6370838" y="1418391"/>
+            <a:off x="5583440" y="1418391"/>
             <a:ext cx="236048" cy="173380"/>
           </a:xfrm>
           <a:prstGeom prst="flowChartDecision">
@@ -4116,7 +4116,7 @@
         </p:nvSpPr>
         <p:spPr>
           <a:xfrm>
-            <a:off x="5735569" y="1035754"/>
+            <a:off x="4948171" y="1035754"/>
             <a:ext cx="189257" cy="178683"/>
           </a:xfrm>
           <a:prstGeom prst="rect">
@@ -4210,8 +4210,8 @@
         </p:nvCxnSpPr>
         <p:spPr>
           <a:xfrm rot="16200000" flipH="1">
-            <a:off x="5128672" y="461355"/>
-            <a:ext cx="121685" cy="1476996"/>
+            <a:off x="4575922" y="696004"/>
+            <a:ext cx="98894" cy="1030489"/>
           </a:xfrm>
           <a:prstGeom prst="bentConnector2">
             <a:avLst/>
@@ -4258,7 +4258,7 @@
         </p:nvCxnSpPr>
         <p:spPr>
           <a:xfrm rot="5400000">
-            <a:off x="6358648" y="1745613"/>
+            <a:off x="5571250" y="1745613"/>
             <a:ext cx="252723" cy="7706"/>
           </a:xfrm>
           <a:prstGeom prst="bentConnector3">
@@ -4617,7 +4617,7 @@
         </p:nvSpPr>
         <p:spPr>
           <a:xfrm>
-            <a:off x="5837090" y="2223312"/>
+            <a:off x="5049692" y="2223312"/>
             <a:ext cx="1288600" cy="480359"/>
           </a:xfrm>
           <a:prstGeom prst="rect">
@@ -4704,7 +4704,7 @@
         </p:nvSpPr>
         <p:spPr>
           <a:xfrm>
-            <a:off x="5836622" y="2114529"/>
+            <a:off x="5049224" y="2114529"/>
             <a:ext cx="1288600" cy="108783"/>
           </a:xfrm>
           <a:prstGeom prst="rect">
@@ -4763,7 +4763,7 @@
         <p:spPr>
           <a:xfrm rot="10800000" flipV="1">
             <a:off x="3074862" y="2002190"/>
-            <a:ext cx="2762229" cy="8978"/>
+            <a:ext cx="1974831" cy="8978"/>
           </a:xfrm>
           <a:prstGeom prst="bentConnector3">
             <a:avLst>
@@ -4775,7 +4775,7 @@
               <a:srgbClr val="7030A0"/>
             </a:solidFill>
             <a:headEnd type="arrow" w="med" len="med"/>
-            <a:tailEnd type="arrow" w="med" len="med"/>
+            <a:tailEnd type="none" w="med" len="med"/>
           </a:ln>
           <a:effectLst/>
         </p:spPr>
@@ -4808,7 +4808,7 @@
         </p:nvSpPr>
         <p:spPr>
           <a:xfrm>
-            <a:off x="5844797" y="3303567"/>
+            <a:off x="5057399" y="3303567"/>
             <a:ext cx="1288132" cy="376743"/>
           </a:xfrm>
           <a:prstGeom prst="rect">
@@ -4881,7 +4881,7 @@
         </p:nvSpPr>
         <p:spPr>
           <a:xfrm>
-            <a:off x="5844329" y="3666287"/>
+            <a:off x="5056931" y="3666287"/>
             <a:ext cx="1288600" cy="1058113"/>
           </a:xfrm>
           <a:prstGeom prst="rect">
@@ -4964,7 +4964,7 @@
         </p:nvCxnSpPr>
         <p:spPr>
           <a:xfrm rot="16200000" flipH="1">
-            <a:off x="6185178" y="2999882"/>
+            <a:off x="5397780" y="2999882"/>
             <a:ext cx="599896" cy="7473"/>
           </a:xfrm>
           <a:prstGeom prst="bentConnector3">
@@ -5011,7 +5011,7 @@
         </p:nvSpPr>
         <p:spPr>
           <a:xfrm>
-            <a:off x="3146562" y="1827996"/>
+            <a:off x="3140483" y="2445117"/>
             <a:ext cx="189257" cy="178683"/>
           </a:xfrm>
           <a:prstGeom prst="rect">
@@ -5051,7 +5051,7 @@
         </p:nvSpPr>
         <p:spPr>
           <a:xfrm>
-            <a:off x="5576132" y="2067071"/>
+            <a:off x="4801775" y="2011168"/>
             <a:ext cx="189257" cy="178683"/>
           </a:xfrm>
           <a:prstGeom prst="rect">
@@ -5096,7 +5096,7 @@
         </p:nvSpPr>
         <p:spPr>
           <a:xfrm>
-            <a:off x="4800366" y="1801945"/>
+            <a:off x="4012968" y="1801945"/>
             <a:ext cx="964789" cy="204722"/>
           </a:xfrm>
           <a:prstGeom prst="rect">
@@ -5136,7 +5136,7 @@
         </p:nvSpPr>
         <p:spPr>
           <a:xfrm>
-            <a:off x="3156102" y="2054051"/>
+            <a:off x="3329974" y="2543388"/>
             <a:ext cx="1208224" cy="160282"/>
           </a:xfrm>
           <a:prstGeom prst="rect">
@@ -5156,7 +5156,182 @@
                   <a:srgbClr val="7030A0"/>
                 </a:solidFill>
               </a:rPr>
-              <a:t>past and future loans</a:t>
+              <a:t>future loans</a:t>
+            </a:r>
+          </a:p>
+        </p:txBody>
+      </p:sp>
+      <p:cxnSp>
+        <p:nvCxnSpPr>
+          <p:cNvPr id="31" name="Straight Arrow Connector 59">
+            <a:extLst>
+              <a:ext uri="{FF2B5EF4-FFF2-40B4-BE49-F238E27FC236}">
+                <a16:creationId xmlns:a16="http://schemas.microsoft.com/office/drawing/2014/main" id="{6BA100F8-E5D8-4F78-A40D-CC0A3FF9C409}"/>
+              </a:ext>
+            </a:extLst>
+          </p:cNvPr>
+          <p:cNvCxnSpPr>
+            <a:cxnSpLocks/>
+          </p:cNvCxnSpPr>
+          <p:nvPr/>
+        </p:nvCxnSpPr>
+        <p:spPr>
+          <a:xfrm rot="10800000" flipV="1">
+            <a:off x="3070318" y="2340847"/>
+            <a:ext cx="1978908" cy="1"/>
+          </a:xfrm>
+          <a:prstGeom prst="bentConnector3">
+            <a:avLst>
+              <a:gd name="adj1" fmla="val 50000"/>
+            </a:avLst>
+          </a:prstGeom>
+          <a:ln w="19050">
+            <a:solidFill>
+              <a:srgbClr val="7030A0"/>
+            </a:solidFill>
+            <a:headEnd type="none" w="med" len="med"/>
+            <a:tailEnd type="arrow" w="med" len="med"/>
+          </a:ln>
+          <a:effectLst/>
+        </p:spPr>
+        <p:style>
+          <a:lnRef idx="1">
+            <a:schemeClr val="accent2"/>
+          </a:lnRef>
+          <a:fillRef idx="2">
+            <a:schemeClr val="accent2"/>
+          </a:fillRef>
+          <a:effectRef idx="1">
+            <a:schemeClr val="accent2"/>
+          </a:effectRef>
+          <a:fontRef idx="minor">
+            <a:schemeClr val="dk1"/>
+          </a:fontRef>
+        </p:style>
+      </p:cxnSp>
+      <p:cxnSp>
+        <p:nvCxnSpPr>
+          <p:cNvPr id="32" name="Straight Arrow Connector 59">
+            <a:extLst>
+              <a:ext uri="{FF2B5EF4-FFF2-40B4-BE49-F238E27FC236}">
+                <a16:creationId xmlns:a16="http://schemas.microsoft.com/office/drawing/2014/main" id="{259BD928-3079-4692-8122-A0094482621E}"/>
+              </a:ext>
+            </a:extLst>
+          </p:cNvPr>
+          <p:cNvCxnSpPr>
+            <a:cxnSpLocks/>
+          </p:cNvCxnSpPr>
+          <p:nvPr/>
+        </p:nvCxnSpPr>
+        <p:spPr>
+          <a:xfrm rot="10800000">
+            <a:off x="3070319" y="2574481"/>
+            <a:ext cx="1986615" cy="6882"/>
+          </a:xfrm>
+          <a:prstGeom prst="bentConnector3">
+            <a:avLst>
+              <a:gd name="adj1" fmla="val 50000"/>
+            </a:avLst>
+          </a:prstGeom>
+          <a:ln w="19050">
+            <a:solidFill>
+              <a:srgbClr val="7030A0"/>
+            </a:solidFill>
+            <a:headEnd type="none" w="med" len="med"/>
+            <a:tailEnd type="arrow" w="med" len="med"/>
+          </a:ln>
+          <a:effectLst/>
+        </p:spPr>
+        <p:style>
+          <a:lnRef idx="1">
+            <a:schemeClr val="accent2"/>
+          </a:lnRef>
+          <a:fillRef idx="2">
+            <a:schemeClr val="accent2"/>
+          </a:fillRef>
+          <a:effectRef idx="1">
+            <a:schemeClr val="accent2"/>
+          </a:effectRef>
+          <a:fontRef idx="minor">
+            <a:schemeClr val="dk1"/>
+          </a:fontRef>
+        </p:style>
+      </p:cxnSp>
+      <p:sp>
+        <p:nvSpPr>
+          <p:cNvPr id="33" name="TextBox 32">
+            <a:extLst>
+              <a:ext uri="{FF2B5EF4-FFF2-40B4-BE49-F238E27FC236}">
+                <a16:creationId xmlns:a16="http://schemas.microsoft.com/office/drawing/2014/main" id="{23EBBEEA-5D1B-46D2-9ED5-03A99DB14D69}"/>
+              </a:ext>
+            </a:extLst>
+          </p:cNvPr>
+          <p:cNvSpPr txBox="1"/>
+          <p:nvPr/>
+        </p:nvSpPr>
+        <p:spPr>
+          <a:xfrm>
+            <a:off x="3142384" y="2211660"/>
+            <a:ext cx="189257" cy="178683"/>
+          </a:xfrm>
+          <a:prstGeom prst="rect">
+            <a:avLst/>
+          </a:prstGeom>
+          <a:noFill/>
+        </p:spPr>
+        <p:txBody>
+          <a:bodyPr wrap="square" lIns="0" tIns="0" rIns="0" bIns="0" rtlCol="0">
+            <a:noAutofit/>
+          </a:bodyPr>
+          <a:lstStyle/>
+          <a:p>
+            <a:pPr algn="ctr"/>
+            <a:r>
+              <a:rPr lang="en-SG" sz="1100" dirty="0">
+                <a:solidFill>
+                  <a:srgbClr val="7030A0"/>
+                </a:solidFill>
+              </a:rPr>
+              <a:t>*</a:t>
+            </a:r>
+          </a:p>
+        </p:txBody>
+      </p:sp>
+      <p:sp>
+        <p:nvSpPr>
+          <p:cNvPr id="34" name="TextBox 33">
+            <a:extLst>
+              <a:ext uri="{FF2B5EF4-FFF2-40B4-BE49-F238E27FC236}">
+                <a16:creationId xmlns:a16="http://schemas.microsoft.com/office/drawing/2014/main" id="{E002C449-631E-49D7-B9B6-8E2B00E9EA81}"/>
+              </a:ext>
+            </a:extLst>
+          </p:cNvPr>
+          <p:cNvSpPr txBox="1"/>
+          <p:nvPr/>
+        </p:nvSpPr>
+        <p:spPr>
+          <a:xfrm>
+            <a:off x="3288635" y="2312905"/>
+            <a:ext cx="1208224" cy="160282"/>
+          </a:xfrm>
+          <a:prstGeom prst="rect">
+            <a:avLst/>
+          </a:prstGeom>
+          <a:noFill/>
+        </p:spPr>
+        <p:txBody>
+          <a:bodyPr wrap="square" lIns="0" tIns="0" rIns="0" bIns="0" rtlCol="0">
+            <a:noAutofit/>
+          </a:bodyPr>
+          <a:lstStyle/>
+          <a:p>
+            <a:r>
+              <a:rPr lang="en-SG" sz="1100" dirty="0">
+                <a:solidFill>
+                  <a:srgbClr val="7030A0"/>
+                </a:solidFill>
+              </a:rPr>
+              <a:t>past loans</a:t>
             </a:r>
           </a:p>
         </p:txBody>

</xml_diff>